<commit_message>
MAJ diapo + test_uni_
</commit_message>
<xml_diff>
--- a/oral_projet/revue_3/diaporama_revue_3_willy.pptx
+++ b/oral_projet/revue_3/diaporama_revue_3_willy.pptx
@@ -10227,10 +10227,10 @@
       </p:cxnSp>
       <p:pic>
         <p:nvPicPr>
-          <p:cNvPr id="4" name="Image 3" descr="Une image contenant capture d’écran&#10;&#10;Description générée avec un niveau de confiance très élevé">
-            <a:extLst>
-              <a:ext uri="{FF2B5EF4-FFF2-40B4-BE49-F238E27FC236}">
-                <a16:creationId xmlns:a16="http://schemas.microsoft.com/office/drawing/2014/main" id="{769F96F7-0C9A-4C12-8DD2-B1BE1D83ECF0}"/>
+          <p:cNvPr id="9" name="Image 8">
+            <a:extLst>
+              <a:ext uri="{FF2B5EF4-FFF2-40B4-BE49-F238E27FC236}">
+                <a16:creationId xmlns:a16="http://schemas.microsoft.com/office/drawing/2014/main" id="{B01860E6-AD2D-4E94-AD8B-C2861A3B35DB}"/>
               </a:ext>
             </a:extLst>
           </p:cNvPr>
@@ -10253,20 +10253,55 @@
         </p:blipFill>
         <p:spPr>
           <a:xfrm>
-            <a:off x="196023" y="3335673"/>
-            <a:ext cx="5791940" cy="1695202"/>
+            <a:off x="5987963" y="1973749"/>
+            <a:ext cx="5892067" cy="4419050"/>
           </a:xfrm>
           <a:prstGeom prst="rect">
             <a:avLst/>
           </a:prstGeom>
         </p:spPr>
       </p:pic>
+      <p:sp>
+        <p:nvSpPr>
+          <p:cNvPr id="25" name="ZoneTexte 24">
+            <a:extLst>
+              <a:ext uri="{FF2B5EF4-FFF2-40B4-BE49-F238E27FC236}">
+                <a16:creationId xmlns:a16="http://schemas.microsoft.com/office/drawing/2014/main" id="{5945C559-2AC8-4826-8DCF-28E5BB387030}"/>
+              </a:ext>
+            </a:extLst>
+          </p:cNvPr>
+          <p:cNvSpPr txBox="1"/>
+          <p:nvPr/>
+        </p:nvSpPr>
+        <p:spPr>
+          <a:xfrm>
+            <a:off x="2216372" y="2043357"/>
+            <a:ext cx="1611339" cy="369332"/>
+          </a:xfrm>
+          <a:prstGeom prst="rect">
+            <a:avLst/>
+          </a:prstGeom>
+          <a:noFill/>
+        </p:spPr>
+        <p:txBody>
+          <a:bodyPr wrap="none" rtlCol="0">
+            <a:spAutoFit/>
+          </a:bodyPr>
+          <a:lstStyle/>
+          <a:p>
+            <a:r>
+              <a:rPr lang="fr-FR" dirty="0"/>
+              <a:t>Boucle 4-20mA</a:t>
+            </a:r>
+          </a:p>
+        </p:txBody>
+      </p:sp>
       <p:pic>
         <p:nvPicPr>
-          <p:cNvPr id="9" name="Image 8">
-            <a:extLst>
-              <a:ext uri="{FF2B5EF4-FFF2-40B4-BE49-F238E27FC236}">
-                <a16:creationId xmlns:a16="http://schemas.microsoft.com/office/drawing/2014/main" id="{B01860E6-AD2D-4E94-AD8B-C2861A3B35DB}"/>
+          <p:cNvPr id="3" name="Image 2">
+            <a:extLst>
+              <a:ext uri="{FF2B5EF4-FFF2-40B4-BE49-F238E27FC236}">
+                <a16:creationId xmlns:a16="http://schemas.microsoft.com/office/drawing/2014/main" id="{BF86B05D-D7F7-41FB-9885-3A0E035A00D4}"/>
               </a:ext>
             </a:extLst>
           </p:cNvPr>
@@ -10289,49 +10324,14 @@
         </p:blipFill>
         <p:spPr>
           <a:xfrm>
-            <a:off x="5987963" y="1973749"/>
-            <a:ext cx="5892067" cy="4419050"/>
+            <a:off x="608491" y="3509924"/>
+            <a:ext cx="5600700" cy="1457325"/>
           </a:xfrm>
           <a:prstGeom prst="rect">
             <a:avLst/>
           </a:prstGeom>
         </p:spPr>
       </p:pic>
-      <p:sp>
-        <p:nvSpPr>
-          <p:cNvPr id="25" name="ZoneTexte 24">
-            <a:extLst>
-              <a:ext uri="{FF2B5EF4-FFF2-40B4-BE49-F238E27FC236}">
-                <a16:creationId xmlns:a16="http://schemas.microsoft.com/office/drawing/2014/main" id="{5945C559-2AC8-4826-8DCF-28E5BB387030}"/>
-              </a:ext>
-            </a:extLst>
-          </p:cNvPr>
-          <p:cNvSpPr txBox="1"/>
-          <p:nvPr/>
-        </p:nvSpPr>
-        <p:spPr>
-          <a:xfrm>
-            <a:off x="2216372" y="2043357"/>
-            <a:ext cx="1611339" cy="369332"/>
-          </a:xfrm>
-          <a:prstGeom prst="rect">
-            <a:avLst/>
-          </a:prstGeom>
-          <a:noFill/>
-        </p:spPr>
-        <p:txBody>
-          <a:bodyPr wrap="none" rtlCol="0">
-            <a:spAutoFit/>
-          </a:bodyPr>
-          <a:lstStyle/>
-          <a:p>
-            <a:r>
-              <a:rPr lang="fr-FR" dirty="0"/>
-              <a:t>Boucle 4-20mA</a:t>
-            </a:r>
-          </a:p>
-        </p:txBody>
-      </p:sp>
     </p:spTree>
     <p:extLst>
       <p:ext uri="{BB962C8B-B14F-4D97-AF65-F5344CB8AC3E}">

</xml_diff>